<commit_message>
Modificacion a la presentacion version 2
</commit_message>
<xml_diff>
--- a/docs/Presentacion_v2.pptx
+++ b/docs/Presentacion_v2.pptx
@@ -117,6 +117,547 @@
 </p:presentation>
 </file>
 
+<file path=ppt/charts/chart1.xml><?xml version="1.0" encoding="utf-8"?>
+<c:chartSpace xmlns:c="http://schemas.openxmlformats.org/drawingml/2006/chart" xmlns:a="http://schemas.openxmlformats.org/drawingml/2006/main" xmlns:r="http://schemas.openxmlformats.org/officeDocument/2006/relationships">
+  <c:lang val="es-AR"/>
+  <c:chart>
+    <c:plotArea>
+      <c:layout/>
+      <c:scatterChart>
+        <c:scatterStyle val="smoothMarker"/>
+        <c:ser>
+          <c:idx val="0"/>
+          <c:order val="0"/>
+          <c:tx>
+            <c:strRef>
+              <c:f>Hoja1!$B$1</c:f>
+              <c:strCache>
+                <c:ptCount val="1"/>
+                <c:pt idx="0">
+                  <c:v>Cant. Vendidas</c:v>
+                </c:pt>
+              </c:strCache>
+            </c:strRef>
+          </c:tx>
+          <c:xVal>
+            <c:numRef>
+              <c:f>Hoja1!$A$2:$A$19</c:f>
+              <c:numCache>
+                <c:formatCode>General</c:formatCode>
+                <c:ptCount val="18"/>
+                <c:pt idx="0">
+                  <c:v>1</c:v>
+                </c:pt>
+                <c:pt idx="1">
+                  <c:v>2</c:v>
+                </c:pt>
+                <c:pt idx="2">
+                  <c:v>3</c:v>
+                </c:pt>
+                <c:pt idx="3">
+                  <c:v>4</c:v>
+                </c:pt>
+                <c:pt idx="4">
+                  <c:v>5</c:v>
+                </c:pt>
+                <c:pt idx="5">
+                  <c:v>6</c:v>
+                </c:pt>
+                <c:pt idx="6">
+                  <c:v>7</c:v>
+                </c:pt>
+                <c:pt idx="7">
+                  <c:v>8</c:v>
+                </c:pt>
+                <c:pt idx="8">
+                  <c:v>9</c:v>
+                </c:pt>
+                <c:pt idx="9">
+                  <c:v>10</c:v>
+                </c:pt>
+                <c:pt idx="10">
+                  <c:v>11</c:v>
+                </c:pt>
+                <c:pt idx="11">
+                  <c:v>12</c:v>
+                </c:pt>
+                <c:pt idx="12">
+                  <c:v>13</c:v>
+                </c:pt>
+                <c:pt idx="13">
+                  <c:v>14</c:v>
+                </c:pt>
+                <c:pt idx="14">
+                  <c:v>15</c:v>
+                </c:pt>
+                <c:pt idx="15">
+                  <c:v>16</c:v>
+                </c:pt>
+                <c:pt idx="16">
+                  <c:v>17</c:v>
+                </c:pt>
+                <c:pt idx="17">
+                  <c:v>18</c:v>
+                </c:pt>
+              </c:numCache>
+            </c:numRef>
+          </c:xVal>
+          <c:yVal>
+            <c:numRef>
+              <c:f>Hoja1!$B$2:$B$19</c:f>
+              <c:numCache>
+                <c:formatCode>General</c:formatCode>
+                <c:ptCount val="18"/>
+                <c:pt idx="0">
+                  <c:v>0</c:v>
+                </c:pt>
+                <c:pt idx="1">
+                  <c:v>1000</c:v>
+                </c:pt>
+                <c:pt idx="2">
+                  <c:v>2000</c:v>
+                </c:pt>
+                <c:pt idx="3">
+                  <c:v>4000</c:v>
+                </c:pt>
+                <c:pt idx="4">
+                  <c:v>5000</c:v>
+                </c:pt>
+                <c:pt idx="5">
+                  <c:v>7000</c:v>
+                </c:pt>
+                <c:pt idx="6">
+                  <c:v>7000</c:v>
+                </c:pt>
+                <c:pt idx="7">
+                  <c:v>8000</c:v>
+                </c:pt>
+                <c:pt idx="8">
+                  <c:v>8000</c:v>
+                </c:pt>
+                <c:pt idx="9">
+                  <c:v>7000</c:v>
+                </c:pt>
+                <c:pt idx="10">
+                  <c:v>7000</c:v>
+                </c:pt>
+                <c:pt idx="11">
+                  <c:v>6000</c:v>
+                </c:pt>
+                <c:pt idx="12">
+                  <c:v>5000</c:v>
+                </c:pt>
+                <c:pt idx="13">
+                  <c:v>5000</c:v>
+                </c:pt>
+                <c:pt idx="14">
+                  <c:v>5000</c:v>
+                </c:pt>
+                <c:pt idx="15">
+                  <c:v>4000</c:v>
+                </c:pt>
+                <c:pt idx="16">
+                  <c:v>4000</c:v>
+                </c:pt>
+                <c:pt idx="17">
+                  <c:v>4000</c:v>
+                </c:pt>
+              </c:numCache>
+            </c:numRef>
+          </c:yVal>
+          <c:smooth val="1"/>
+        </c:ser>
+        <c:ser>
+          <c:idx val="1"/>
+          <c:order val="1"/>
+          <c:tx>
+            <c:strRef>
+              <c:f>Hoja1!$C$1</c:f>
+              <c:strCache>
+                <c:ptCount val="1"/>
+                <c:pt idx="0">
+                  <c:v>Ingreso</c:v>
+                </c:pt>
+              </c:strCache>
+            </c:strRef>
+          </c:tx>
+          <c:xVal>
+            <c:numRef>
+              <c:f>Hoja1!$A$2:$A$19</c:f>
+              <c:numCache>
+                <c:formatCode>General</c:formatCode>
+                <c:ptCount val="18"/>
+                <c:pt idx="0">
+                  <c:v>1</c:v>
+                </c:pt>
+                <c:pt idx="1">
+                  <c:v>2</c:v>
+                </c:pt>
+                <c:pt idx="2">
+                  <c:v>3</c:v>
+                </c:pt>
+                <c:pt idx="3">
+                  <c:v>4</c:v>
+                </c:pt>
+                <c:pt idx="4">
+                  <c:v>5</c:v>
+                </c:pt>
+                <c:pt idx="5">
+                  <c:v>6</c:v>
+                </c:pt>
+                <c:pt idx="6">
+                  <c:v>7</c:v>
+                </c:pt>
+                <c:pt idx="7">
+                  <c:v>8</c:v>
+                </c:pt>
+                <c:pt idx="8">
+                  <c:v>9</c:v>
+                </c:pt>
+                <c:pt idx="9">
+                  <c:v>10</c:v>
+                </c:pt>
+                <c:pt idx="10">
+                  <c:v>11</c:v>
+                </c:pt>
+                <c:pt idx="11">
+                  <c:v>12</c:v>
+                </c:pt>
+                <c:pt idx="12">
+                  <c:v>13</c:v>
+                </c:pt>
+                <c:pt idx="13">
+                  <c:v>14</c:v>
+                </c:pt>
+                <c:pt idx="14">
+                  <c:v>15</c:v>
+                </c:pt>
+                <c:pt idx="15">
+                  <c:v>16</c:v>
+                </c:pt>
+                <c:pt idx="16">
+                  <c:v>17</c:v>
+                </c:pt>
+                <c:pt idx="17">
+                  <c:v>18</c:v>
+                </c:pt>
+              </c:numCache>
+            </c:numRef>
+          </c:xVal>
+          <c:yVal>
+            <c:numRef>
+              <c:f>Hoja1!$C$2:$C$19</c:f>
+              <c:numCache>
+                <c:formatCode>General</c:formatCode>
+                <c:ptCount val="18"/>
+                <c:pt idx="0">
+                  <c:v>0</c:v>
+                </c:pt>
+                <c:pt idx="1">
+                  <c:v>5000</c:v>
+                </c:pt>
+                <c:pt idx="2">
+                  <c:v>10000</c:v>
+                </c:pt>
+                <c:pt idx="3">
+                  <c:v>20000</c:v>
+                </c:pt>
+                <c:pt idx="4">
+                  <c:v>25000</c:v>
+                </c:pt>
+                <c:pt idx="5">
+                  <c:v>35000</c:v>
+                </c:pt>
+                <c:pt idx="6">
+                  <c:v>35000</c:v>
+                </c:pt>
+                <c:pt idx="7">
+                  <c:v>40000</c:v>
+                </c:pt>
+                <c:pt idx="8">
+                  <c:v>40000</c:v>
+                </c:pt>
+                <c:pt idx="9">
+                  <c:v>35000</c:v>
+                </c:pt>
+                <c:pt idx="10">
+                  <c:v>35000</c:v>
+                </c:pt>
+                <c:pt idx="11">
+                  <c:v>30000</c:v>
+                </c:pt>
+                <c:pt idx="12">
+                  <c:v>25000</c:v>
+                </c:pt>
+                <c:pt idx="13">
+                  <c:v>25000</c:v>
+                </c:pt>
+                <c:pt idx="14">
+                  <c:v>25000</c:v>
+                </c:pt>
+                <c:pt idx="15">
+                  <c:v>20000</c:v>
+                </c:pt>
+                <c:pt idx="16">
+                  <c:v>20000</c:v>
+                </c:pt>
+                <c:pt idx="17">
+                  <c:v>20000</c:v>
+                </c:pt>
+              </c:numCache>
+            </c:numRef>
+          </c:yVal>
+          <c:smooth val="1"/>
+        </c:ser>
+        <c:ser>
+          <c:idx val="2"/>
+          <c:order val="2"/>
+          <c:tx>
+            <c:strRef>
+              <c:f>Hoja1!$D$1</c:f>
+              <c:strCache>
+                <c:ptCount val="1"/>
+                <c:pt idx="0">
+                  <c:v>Costos</c:v>
+                </c:pt>
+              </c:strCache>
+            </c:strRef>
+          </c:tx>
+          <c:xVal>
+            <c:numRef>
+              <c:f>Hoja1!$A$2:$A$19</c:f>
+              <c:numCache>
+                <c:formatCode>General</c:formatCode>
+                <c:ptCount val="18"/>
+                <c:pt idx="0">
+                  <c:v>1</c:v>
+                </c:pt>
+                <c:pt idx="1">
+                  <c:v>2</c:v>
+                </c:pt>
+                <c:pt idx="2">
+                  <c:v>3</c:v>
+                </c:pt>
+                <c:pt idx="3">
+                  <c:v>4</c:v>
+                </c:pt>
+                <c:pt idx="4">
+                  <c:v>5</c:v>
+                </c:pt>
+                <c:pt idx="5">
+                  <c:v>6</c:v>
+                </c:pt>
+                <c:pt idx="6">
+                  <c:v>7</c:v>
+                </c:pt>
+                <c:pt idx="7">
+                  <c:v>8</c:v>
+                </c:pt>
+                <c:pt idx="8">
+                  <c:v>9</c:v>
+                </c:pt>
+                <c:pt idx="9">
+                  <c:v>10</c:v>
+                </c:pt>
+                <c:pt idx="10">
+                  <c:v>11</c:v>
+                </c:pt>
+                <c:pt idx="11">
+                  <c:v>12</c:v>
+                </c:pt>
+                <c:pt idx="12">
+                  <c:v>13</c:v>
+                </c:pt>
+                <c:pt idx="13">
+                  <c:v>14</c:v>
+                </c:pt>
+                <c:pt idx="14">
+                  <c:v>15</c:v>
+                </c:pt>
+                <c:pt idx="15">
+                  <c:v>16</c:v>
+                </c:pt>
+                <c:pt idx="16">
+                  <c:v>17</c:v>
+                </c:pt>
+                <c:pt idx="17">
+                  <c:v>18</c:v>
+                </c:pt>
+              </c:numCache>
+            </c:numRef>
+          </c:xVal>
+          <c:yVal>
+            <c:numRef>
+              <c:f>Hoja1!$D$2:$D$19</c:f>
+              <c:numCache>
+                <c:formatCode>General</c:formatCode>
+                <c:ptCount val="18"/>
+                <c:pt idx="0">
+                  <c:v>26000</c:v>
+                </c:pt>
+                <c:pt idx="1">
+                  <c:v>18143.16</c:v>
+                </c:pt>
+                <c:pt idx="2">
+                  <c:v>18143.16</c:v>
+                </c:pt>
+                <c:pt idx="3">
+                  <c:v>18143.16</c:v>
+                </c:pt>
+                <c:pt idx="4">
+                  <c:v>18143.16</c:v>
+                </c:pt>
+                <c:pt idx="5">
+                  <c:v>18143.16</c:v>
+                </c:pt>
+                <c:pt idx="6">
+                  <c:v>18143.16</c:v>
+                </c:pt>
+                <c:pt idx="7">
+                  <c:v>18143.16</c:v>
+                </c:pt>
+                <c:pt idx="8">
+                  <c:v>18143.16</c:v>
+                </c:pt>
+                <c:pt idx="9">
+                  <c:v>18143.16</c:v>
+                </c:pt>
+                <c:pt idx="10">
+                  <c:v>18143.16</c:v>
+                </c:pt>
+                <c:pt idx="11">
+                  <c:v>18143.16</c:v>
+                </c:pt>
+                <c:pt idx="12">
+                  <c:v>18143.16</c:v>
+                </c:pt>
+                <c:pt idx="13">
+                  <c:v>18143.16</c:v>
+                </c:pt>
+                <c:pt idx="14">
+                  <c:v>18143.16</c:v>
+                </c:pt>
+                <c:pt idx="15">
+                  <c:v>18143.16</c:v>
+                </c:pt>
+                <c:pt idx="16">
+                  <c:v>18143.16</c:v>
+                </c:pt>
+                <c:pt idx="17">
+                  <c:v>18143.16</c:v>
+                </c:pt>
+              </c:numCache>
+            </c:numRef>
+          </c:yVal>
+          <c:smooth val="1"/>
+        </c:ser>
+        <c:axId val="52926720"/>
+        <c:axId val="53963776"/>
+      </c:scatterChart>
+      <c:valAx>
+        <c:axId val="52926720"/>
+        <c:scaling>
+          <c:orientation val="minMax"/>
+        </c:scaling>
+        <c:axPos val="b"/>
+        <c:majorGridlines/>
+        <c:title>
+          <c:tx>
+            <c:rich>
+              <a:bodyPr/>
+              <a:lstStyle/>
+              <a:p>
+                <a:pPr>
+                  <a:defRPr sz="1400"/>
+                </a:pPr>
+                <a:r>
+                  <a:rPr lang="es-AR" sz="1400"/>
+                  <a:t>Bimestres</a:t>
+                </a:r>
+              </a:p>
+            </c:rich>
+          </c:tx>
+          <c:layout/>
+        </c:title>
+        <c:numFmt formatCode="General" sourceLinked="1"/>
+        <c:tickLblPos val="nextTo"/>
+        <c:txPr>
+          <a:bodyPr/>
+          <a:lstStyle/>
+          <a:p>
+            <a:pPr>
+              <a:defRPr sz="1400"/>
+            </a:pPr>
+            <a:endParaRPr lang="es-AR"/>
+          </a:p>
+        </c:txPr>
+        <c:crossAx val="53963776"/>
+        <c:crosses val="autoZero"/>
+        <c:crossBetween val="midCat"/>
+        <c:majorUnit val="1"/>
+      </c:valAx>
+      <c:valAx>
+        <c:axId val="53963776"/>
+        <c:scaling>
+          <c:orientation val="minMax"/>
+        </c:scaling>
+        <c:axPos val="l"/>
+        <c:majorGridlines/>
+        <c:title>
+          <c:tx>
+            <c:rich>
+              <a:bodyPr rot="-5400000" vert="horz"/>
+              <a:lstStyle/>
+              <a:p>
+                <a:pPr>
+                  <a:defRPr sz="1400"/>
+                </a:pPr>
+                <a:r>
+                  <a:rPr lang="es-AR" sz="1400"/>
+                  <a:t>Monto (ARS)</a:t>
+                </a:r>
+              </a:p>
+            </c:rich>
+          </c:tx>
+          <c:layout/>
+        </c:title>
+        <c:numFmt formatCode="General" sourceLinked="1"/>
+        <c:tickLblPos val="nextTo"/>
+        <c:txPr>
+          <a:bodyPr/>
+          <a:lstStyle/>
+          <a:p>
+            <a:pPr>
+              <a:defRPr sz="1400"/>
+            </a:pPr>
+            <a:endParaRPr lang="es-AR"/>
+          </a:p>
+        </c:txPr>
+        <c:crossAx val="52926720"/>
+        <c:crosses val="autoZero"/>
+        <c:crossBetween val="midCat"/>
+      </c:valAx>
+    </c:plotArea>
+    <c:legend>
+      <c:legendPos val="r"/>
+      <c:layout/>
+      <c:txPr>
+        <a:bodyPr/>
+        <a:lstStyle/>
+        <a:p>
+          <a:pPr>
+            <a:defRPr sz="1400"/>
+          </a:pPr>
+          <a:endParaRPr lang="es-AR"/>
+        </a:p>
+      </c:txPr>
+    </c:legend>
+    <c:plotVisOnly val="1"/>
+  </c:chart>
+  <c:externalData r:id="rId1"/>
+</c:chartSpace>
+</file>
+
 <file path=ppt/notesMasters/notesMaster1.xml><?xml version="1.0" encoding="utf-8"?>
 <p:notesMaster xmlns:a="http://schemas.openxmlformats.org/drawingml/2006/main" xmlns:r="http://schemas.openxmlformats.org/officeDocument/2006/relationships" xmlns:p="http://schemas.openxmlformats.org/presentationml/2006/main">
   <p:cSld>
@@ -200,7 +741,7 @@
             <a:fld id="{0BDB093D-7EE5-483A-9D7B-A1A2E1CBECD6}" type="datetimeFigureOut">
               <a:rPr lang="es-AR" smtClean="0"/>
               <a:pPr/>
-              <a:t>23/04/2012</a:t>
+              <a:t>24/04/2012</a:t>
             </a:fld>
             <a:endParaRPr lang="es-AR"/>
           </a:p>
@@ -730,7 +1271,7 @@
             <a:fld id="{00D03AD9-B274-4317-8993-B21EFD32709D}" type="datetimeFigureOut">
               <a:rPr lang="es-AR" smtClean="0"/>
               <a:pPr/>
-              <a:t>23/04/2012</a:t>
+              <a:t>24/04/2012</a:t>
             </a:fld>
             <a:endParaRPr lang="es-AR"/>
           </a:p>
@@ -782,7 +1323,7 @@
     </p:spTree>
     <p:extLst>
       <p:ext uri="{BB962C8B-B14F-4D97-AF65-F5344CB8AC3E}">
-        <p14:creationId xmlns="" xmlns:p14="http://schemas.microsoft.com/office/powerpoint/2010/main" val="4216029542"/>
+        <p14:creationId xmlns:p14="http://schemas.microsoft.com/office/powerpoint/2010/main" xmlns="" val="4216029542"/>
       </p:ext>
     </p:extLst>
   </p:cSld>
@@ -902,7 +1443,7 @@
             <a:fld id="{00D03AD9-B274-4317-8993-B21EFD32709D}" type="datetimeFigureOut">
               <a:rPr lang="es-AR" smtClean="0"/>
               <a:pPr/>
-              <a:t>23/04/2012</a:t>
+              <a:t>24/04/2012</a:t>
             </a:fld>
             <a:endParaRPr lang="es-AR"/>
           </a:p>
@@ -954,7 +1495,7 @@
     </p:spTree>
     <p:extLst>
       <p:ext uri="{BB962C8B-B14F-4D97-AF65-F5344CB8AC3E}">
-        <p14:creationId xmlns="" xmlns:p14="http://schemas.microsoft.com/office/powerpoint/2010/main" val="1477062740"/>
+        <p14:creationId xmlns:p14="http://schemas.microsoft.com/office/powerpoint/2010/main" xmlns="" val="1477062740"/>
       </p:ext>
     </p:extLst>
   </p:cSld>
@@ -1084,7 +1625,7 @@
             <a:fld id="{00D03AD9-B274-4317-8993-B21EFD32709D}" type="datetimeFigureOut">
               <a:rPr lang="es-AR" smtClean="0"/>
               <a:pPr/>
-              <a:t>23/04/2012</a:t>
+              <a:t>24/04/2012</a:t>
             </a:fld>
             <a:endParaRPr lang="es-AR"/>
           </a:p>
@@ -1136,7 +1677,7 @@
     </p:spTree>
     <p:extLst>
       <p:ext uri="{BB962C8B-B14F-4D97-AF65-F5344CB8AC3E}">
-        <p14:creationId xmlns="" xmlns:p14="http://schemas.microsoft.com/office/powerpoint/2010/main" val="223054616"/>
+        <p14:creationId xmlns:p14="http://schemas.microsoft.com/office/powerpoint/2010/main" xmlns="" val="223054616"/>
       </p:ext>
     </p:extLst>
   </p:cSld>
@@ -1256,7 +1797,7 @@
             <a:fld id="{00D03AD9-B274-4317-8993-B21EFD32709D}" type="datetimeFigureOut">
               <a:rPr lang="es-AR" smtClean="0"/>
               <a:pPr/>
-              <a:t>23/04/2012</a:t>
+              <a:t>24/04/2012</a:t>
             </a:fld>
             <a:endParaRPr lang="es-AR"/>
           </a:p>
@@ -1308,7 +1849,7 @@
     </p:spTree>
     <p:extLst>
       <p:ext uri="{BB962C8B-B14F-4D97-AF65-F5344CB8AC3E}">
-        <p14:creationId xmlns="" xmlns:p14="http://schemas.microsoft.com/office/powerpoint/2010/main" val="1914491051"/>
+        <p14:creationId xmlns:p14="http://schemas.microsoft.com/office/powerpoint/2010/main" xmlns="" val="1914491051"/>
       </p:ext>
     </p:extLst>
   </p:cSld>
@@ -1504,7 +2045,7 @@
             <a:fld id="{00D03AD9-B274-4317-8993-B21EFD32709D}" type="datetimeFigureOut">
               <a:rPr lang="es-AR" smtClean="0"/>
               <a:pPr/>
-              <a:t>23/04/2012</a:t>
+              <a:t>24/04/2012</a:t>
             </a:fld>
             <a:endParaRPr lang="es-AR"/>
           </a:p>
@@ -1556,7 +2097,7 @@
     </p:spTree>
     <p:extLst>
       <p:ext uri="{BB962C8B-B14F-4D97-AF65-F5344CB8AC3E}">
-        <p14:creationId xmlns="" xmlns:p14="http://schemas.microsoft.com/office/powerpoint/2010/main" val="3655691279"/>
+        <p14:creationId xmlns:p14="http://schemas.microsoft.com/office/powerpoint/2010/main" xmlns="" val="3655691279"/>
       </p:ext>
     </p:extLst>
   </p:cSld>
@@ -1794,7 +2335,7 @@
             <a:fld id="{00D03AD9-B274-4317-8993-B21EFD32709D}" type="datetimeFigureOut">
               <a:rPr lang="es-AR" smtClean="0"/>
               <a:pPr/>
-              <a:t>23/04/2012</a:t>
+              <a:t>24/04/2012</a:t>
             </a:fld>
             <a:endParaRPr lang="es-AR"/>
           </a:p>
@@ -1846,7 +2387,7 @@
     </p:spTree>
     <p:extLst>
       <p:ext uri="{BB962C8B-B14F-4D97-AF65-F5344CB8AC3E}">
-        <p14:creationId xmlns="" xmlns:p14="http://schemas.microsoft.com/office/powerpoint/2010/main" val="3243285389"/>
+        <p14:creationId xmlns:p14="http://schemas.microsoft.com/office/powerpoint/2010/main" xmlns="" val="3243285389"/>
       </p:ext>
     </p:extLst>
   </p:cSld>
@@ -2218,7 +2759,7 @@
             <a:fld id="{00D03AD9-B274-4317-8993-B21EFD32709D}" type="datetimeFigureOut">
               <a:rPr lang="es-AR" smtClean="0"/>
               <a:pPr/>
-              <a:t>23/04/2012</a:t>
+              <a:t>24/04/2012</a:t>
             </a:fld>
             <a:endParaRPr lang="es-AR"/>
           </a:p>
@@ -2270,7 +2811,7 @@
     </p:spTree>
     <p:extLst>
       <p:ext uri="{BB962C8B-B14F-4D97-AF65-F5344CB8AC3E}">
-        <p14:creationId xmlns="" xmlns:p14="http://schemas.microsoft.com/office/powerpoint/2010/main" val="2636274983"/>
+        <p14:creationId xmlns:p14="http://schemas.microsoft.com/office/powerpoint/2010/main" xmlns="" val="2636274983"/>
       </p:ext>
     </p:extLst>
   </p:cSld>
@@ -2338,7 +2879,7 @@
             <a:fld id="{00D03AD9-B274-4317-8993-B21EFD32709D}" type="datetimeFigureOut">
               <a:rPr lang="es-AR" smtClean="0"/>
               <a:pPr/>
-              <a:t>23/04/2012</a:t>
+              <a:t>24/04/2012</a:t>
             </a:fld>
             <a:endParaRPr lang="es-AR"/>
           </a:p>
@@ -2390,7 +2931,7 @@
     </p:spTree>
     <p:extLst>
       <p:ext uri="{BB962C8B-B14F-4D97-AF65-F5344CB8AC3E}">
-        <p14:creationId xmlns="" xmlns:p14="http://schemas.microsoft.com/office/powerpoint/2010/main" val="3269143888"/>
+        <p14:creationId xmlns:p14="http://schemas.microsoft.com/office/powerpoint/2010/main" xmlns="" val="3269143888"/>
       </p:ext>
     </p:extLst>
   </p:cSld>
@@ -2435,7 +2976,7 @@
             <a:fld id="{00D03AD9-B274-4317-8993-B21EFD32709D}" type="datetimeFigureOut">
               <a:rPr lang="es-AR" smtClean="0"/>
               <a:pPr/>
-              <a:t>23/04/2012</a:t>
+              <a:t>24/04/2012</a:t>
             </a:fld>
             <a:endParaRPr lang="es-AR"/>
           </a:p>
@@ -2487,7 +3028,7 @@
     </p:spTree>
     <p:extLst>
       <p:ext uri="{BB962C8B-B14F-4D97-AF65-F5344CB8AC3E}">
-        <p14:creationId xmlns="" xmlns:p14="http://schemas.microsoft.com/office/powerpoint/2010/main" val="1678523345"/>
+        <p14:creationId xmlns:p14="http://schemas.microsoft.com/office/powerpoint/2010/main" xmlns="" val="1678523345"/>
       </p:ext>
     </p:extLst>
   </p:cSld>
@@ -2714,7 +3255,7 @@
             <a:fld id="{00D03AD9-B274-4317-8993-B21EFD32709D}" type="datetimeFigureOut">
               <a:rPr lang="es-AR" smtClean="0"/>
               <a:pPr/>
-              <a:t>23/04/2012</a:t>
+              <a:t>24/04/2012</a:t>
             </a:fld>
             <a:endParaRPr lang="es-AR"/>
           </a:p>
@@ -2766,7 +3307,7 @@
     </p:spTree>
     <p:extLst>
       <p:ext uri="{BB962C8B-B14F-4D97-AF65-F5344CB8AC3E}">
-        <p14:creationId xmlns="" xmlns:p14="http://schemas.microsoft.com/office/powerpoint/2010/main" val="3056079155"/>
+        <p14:creationId xmlns:p14="http://schemas.microsoft.com/office/powerpoint/2010/main" xmlns="" val="3056079155"/>
       </p:ext>
     </p:extLst>
   </p:cSld>
@@ -2969,7 +3510,7 @@
             <a:fld id="{00D03AD9-B274-4317-8993-B21EFD32709D}" type="datetimeFigureOut">
               <a:rPr lang="es-AR" smtClean="0"/>
               <a:pPr/>
-              <a:t>23/04/2012</a:t>
+              <a:t>24/04/2012</a:t>
             </a:fld>
             <a:endParaRPr lang="es-AR"/>
           </a:p>
@@ -3021,7 +3562,7 @@
     </p:spTree>
     <p:extLst>
       <p:ext uri="{BB962C8B-B14F-4D97-AF65-F5344CB8AC3E}">
-        <p14:creationId xmlns="" xmlns:p14="http://schemas.microsoft.com/office/powerpoint/2010/main" val="2796445100"/>
+        <p14:creationId xmlns:p14="http://schemas.microsoft.com/office/powerpoint/2010/main" xmlns="" val="2796445100"/>
       </p:ext>
     </p:extLst>
   </p:cSld>
@@ -3193,7 +3734,7 @@
             <a:fld id="{00D03AD9-B274-4317-8993-B21EFD32709D}" type="datetimeFigureOut">
               <a:rPr lang="es-AR" smtClean="0"/>
               <a:pPr/>
-              <a:t>23/04/2012</a:t>
+              <a:t>24/04/2012</a:t>
             </a:fld>
             <a:endParaRPr lang="es-AR"/>
           </a:p>
@@ -3281,7 +3822,7 @@
     </p:spTree>
     <p:extLst>
       <p:ext uri="{BB962C8B-B14F-4D97-AF65-F5344CB8AC3E}">
-        <p14:creationId xmlns="" xmlns:p14="http://schemas.microsoft.com/office/powerpoint/2010/main" val="2985976193"/>
+        <p14:creationId xmlns:p14="http://schemas.microsoft.com/office/powerpoint/2010/main" xmlns="" val="2985976193"/>
       </p:ext>
     </p:extLst>
   </p:cSld>
@@ -3659,7 +4200,7 @@
           <a:blip r:embed="rId3" cstate="print">
             <a:extLst>
               <a:ext uri="{28A0092B-C50C-407E-A947-70E740481C1C}">
-                <a14:useLocalDpi xmlns="" xmlns:a14="http://schemas.microsoft.com/office/drawing/2010/main" val="0"/>
+                <a14:useLocalDpi xmlns:a14="http://schemas.microsoft.com/office/drawing/2010/main" xmlns="" val="0"/>
               </a:ext>
             </a:extLst>
           </a:blip>
@@ -3762,7 +4303,7 @@
     </p:spTree>
     <p:extLst>
       <p:ext uri="{BB962C8B-B14F-4D97-AF65-F5344CB8AC3E}">
-        <p14:creationId xmlns="" xmlns:p14="http://schemas.microsoft.com/office/powerpoint/2010/main" val="1289667085"/>
+        <p14:creationId xmlns:p14="http://schemas.microsoft.com/office/powerpoint/2010/main" xmlns="" val="1289667085"/>
       </p:ext>
     </p:extLst>
   </p:cSld>
@@ -3888,7 +4429,7 @@
           <a:blip r:embed="rId2" cstate="print">
             <a:extLst>
               <a:ext uri="{28A0092B-C50C-407E-A947-70E740481C1C}">
-                <a14:useLocalDpi xmlns="" xmlns:a14="http://schemas.microsoft.com/office/drawing/2010/main" val="0"/>
+                <a14:useLocalDpi xmlns:a14="http://schemas.microsoft.com/office/drawing/2010/main" xmlns="" val="0"/>
               </a:ext>
             </a:extLst>
           </a:blip>
@@ -4020,11 +4561,7 @@
             <a:pPr algn="just"/>
             <a:r>
               <a:rPr lang="es-AR" sz="3600" dirty="0" smtClean="0"/>
-              <a:t>Somos una organización joven que nos proponemos ofrecer un método alternativo, superior y más eficiente a los servicios ya existentes de emergencias, que garantice prevenir y actuar rápidamente ante eventuales situaciones de inseguridad</a:t>
-            </a:r>
-            <a:r>
-              <a:rPr lang="es-AR" sz="3600" dirty="0" smtClean="0"/>
-              <a:t>.</a:t>
+              <a:t>Somos una organización joven que nos proponemos ofrecer un método alternativo, superior y más eficiente a los servicios ya existentes de emergencias, que garantice prevenir y actuar rápidamente ante eventuales situaciones de inseguridad.</a:t>
             </a:r>
             <a:endParaRPr lang="es-AR" sz="3600" dirty="0"/>
           </a:p>
@@ -4033,7 +4570,7 @@
     </p:spTree>
     <p:extLst>
       <p:ext uri="{BB962C8B-B14F-4D97-AF65-F5344CB8AC3E}">
-        <p14:creationId xmlns="" xmlns:p14="http://schemas.microsoft.com/office/powerpoint/2010/main" val="2688607078"/>
+        <p14:creationId xmlns:p14="http://schemas.microsoft.com/office/powerpoint/2010/main" xmlns="" val="2688607078"/>
       </p:ext>
     </p:extLst>
   </p:cSld>
@@ -4159,7 +4696,7 @@
           <a:blip r:embed="rId2" cstate="print">
             <a:extLst>
               <a:ext uri="{28A0092B-C50C-407E-A947-70E740481C1C}">
-                <a14:useLocalDpi xmlns="" xmlns:a14="http://schemas.microsoft.com/office/drawing/2010/main" val="0"/>
+                <a14:useLocalDpi xmlns:a14="http://schemas.microsoft.com/office/drawing/2010/main" xmlns="" val="0"/>
               </a:ext>
             </a:extLst>
           </a:blip>
@@ -4294,11 +4831,7 @@
             </a:pPr>
             <a:r>
               <a:rPr lang="es-AR" sz="3600" dirty="0" smtClean="0"/>
-              <a:t>Herramienta de </a:t>
-            </a:r>
-            <a:r>
-              <a:rPr lang="es-AR" sz="3600" dirty="0" smtClean="0"/>
-              <a:t>localización rápida y efectiva.</a:t>
+              <a:t>Herramienta de localización rápida y efectiva.</a:t>
             </a:r>
           </a:p>
           <a:p>
@@ -4310,7 +4843,6 @@
               <a:rPr lang="es-AR" sz="3600" dirty="0" smtClean="0"/>
               <a:t>Sincronizada con agentes de seguridad.</a:t>
             </a:r>
-            <a:endParaRPr lang="es-AR" sz="3600" dirty="0" smtClean="0"/>
           </a:p>
           <a:p>
             <a:pPr marL="571500" indent="-571500">
@@ -4335,11 +4867,7 @@
             </a:r>
             <a:r>
               <a:rPr lang="es-AR" sz="3600" dirty="0" smtClean="0"/>
-              <a:t>vida</a:t>
-            </a:r>
-            <a:r>
-              <a:rPr lang="es-AR" sz="3600" dirty="0" smtClean="0"/>
-              <a:t>.</a:t>
+              <a:t>vida.</a:t>
             </a:r>
           </a:p>
           <a:p>
@@ -4349,24 +4877,15 @@
             </a:pPr>
             <a:r>
               <a:rPr lang="es-AR" sz="3600" dirty="0" smtClean="0"/>
-              <a:t>Reducir </a:t>
-            </a:r>
-            <a:r>
-              <a:rPr lang="es-AR" sz="3600" dirty="0" smtClean="0"/>
-              <a:t>la </a:t>
-            </a:r>
-            <a:r>
-              <a:rPr lang="es-AR" sz="3600" dirty="0" smtClean="0"/>
-              <a:t>criminalidad.</a:t>
-            </a:r>
-            <a:endParaRPr lang="es-AR" sz="3600" dirty="0" smtClean="0"/>
+              <a:t>Reducir la criminalidad.</a:t>
+            </a:r>
           </a:p>
         </p:txBody>
       </p:sp>
     </p:spTree>
     <p:extLst>
       <p:ext uri="{BB962C8B-B14F-4D97-AF65-F5344CB8AC3E}">
-        <p14:creationId xmlns="" xmlns:p14="http://schemas.microsoft.com/office/powerpoint/2010/main" val="1212818162"/>
+        <p14:creationId xmlns:p14="http://schemas.microsoft.com/office/powerpoint/2010/main" xmlns="" val="1212818162"/>
       </p:ext>
     </p:extLst>
   </p:cSld>
@@ -4492,7 +5011,7 @@
           <a:blip r:embed="rId2" cstate="print">
             <a:extLst>
               <a:ext uri="{28A0092B-C50C-407E-A947-70E740481C1C}">
-                <a14:useLocalDpi xmlns="" xmlns:a14="http://schemas.microsoft.com/office/drawing/2010/main" val="0"/>
+                <a14:useLocalDpi xmlns:a14="http://schemas.microsoft.com/office/drawing/2010/main" xmlns="" val="0"/>
               </a:ext>
             </a:extLst>
           </a:blip>
@@ -4627,15 +5146,7 @@
             </a:pPr>
             <a:r>
               <a:rPr lang="es-AR" sz="3600" dirty="0" smtClean="0"/>
-              <a:t>Acceso </a:t>
-            </a:r>
-            <a:r>
-              <a:rPr lang="es-AR" sz="3600" dirty="0" smtClean="0"/>
-              <a:t>masivo</a:t>
-            </a:r>
-            <a:r>
-              <a:rPr lang="es-AR" sz="3600" dirty="0" smtClean="0"/>
-              <a:t>: Ciudadano</a:t>
+              <a:t>Acceso masivo: Ciudadano</a:t>
             </a:r>
           </a:p>
           <a:p>
@@ -4659,11 +5170,7 @@
             </a:r>
             <a:r>
               <a:rPr lang="es-AR" sz="3600" dirty="0" smtClean="0"/>
-              <a:t>acceso</a:t>
-            </a:r>
-            <a:r>
-              <a:rPr lang="es-AR" sz="3600" dirty="0" smtClean="0"/>
-              <a:t>.</a:t>
+              <a:t>acceso.</a:t>
             </a:r>
           </a:p>
           <a:p>
@@ -4677,21 +5184,8 @@
             </a:r>
             <a:r>
               <a:rPr lang="es-AR" sz="3600" dirty="0" smtClean="0"/>
-              <a:t>: </a:t>
-            </a:r>
-            <a:r>
-              <a:rPr lang="es-AR" sz="3600" dirty="0" smtClean="0"/>
-              <a:t>Empresarial </a:t>
-            </a:r>
-            <a:r>
-              <a:rPr lang="es-AR" sz="3600" dirty="0" smtClean="0"/>
-              <a:t>o </a:t>
-            </a:r>
-            <a:r>
-              <a:rPr lang="es-AR" sz="3600" dirty="0" smtClean="0"/>
-              <a:t>Familiar</a:t>
-            </a:r>
-            <a:endParaRPr lang="es-AR" sz="3600" dirty="0" smtClean="0"/>
+              <a:t>: Empresarial o Familiar</a:t>
+            </a:r>
           </a:p>
           <a:p>
             <a:pPr marL="1028700" lvl="1" indent="-571500">
@@ -4704,15 +5198,7 @@
             </a:r>
             <a:r>
               <a:rPr lang="es-AR" sz="3600" dirty="0" smtClean="0"/>
-              <a:t>pe</a:t>
-            </a:r>
-            <a:r>
-              <a:rPr lang="es-AR" sz="3600" dirty="0" smtClean="0"/>
-              <a:t>riódico</a:t>
-            </a:r>
-            <a:r>
-              <a:rPr lang="es-AR" sz="3600" dirty="0" smtClean="0"/>
-              <a:t>.</a:t>
+              <a:t>periódico.</a:t>
             </a:r>
           </a:p>
           <a:p>
@@ -4726,15 +5212,7 @@
             </a:r>
             <a:r>
               <a:rPr lang="es-AR" sz="3600" dirty="0" smtClean="0"/>
-              <a:t>z</a:t>
-            </a:r>
-            <a:r>
-              <a:rPr lang="es-AR" sz="3600" dirty="0" smtClean="0"/>
-              <a:t>ona peligrosa</a:t>
-            </a:r>
-            <a:r>
-              <a:rPr lang="es-AR" sz="3600" dirty="0" smtClean="0"/>
-              <a:t>.</a:t>
+              <a:t>zona peligrosa.</a:t>
             </a:r>
           </a:p>
           <a:p>
@@ -4761,7 +5239,7 @@
     </p:spTree>
     <p:extLst>
       <p:ext uri="{BB962C8B-B14F-4D97-AF65-F5344CB8AC3E}">
-        <p14:creationId xmlns="" xmlns:p14="http://schemas.microsoft.com/office/powerpoint/2010/main" val="72379645"/>
+        <p14:creationId xmlns:p14="http://schemas.microsoft.com/office/powerpoint/2010/main" xmlns="" val="72379645"/>
       </p:ext>
     </p:extLst>
   </p:cSld>
@@ -4887,7 +5365,7 @@
           <a:blip r:embed="rId2" cstate="print">
             <a:extLst>
               <a:ext uri="{28A0092B-C50C-407E-A947-70E740481C1C}">
-                <a14:useLocalDpi xmlns="" xmlns:a14="http://schemas.microsoft.com/office/drawing/2010/main" val="0"/>
+                <a14:useLocalDpi xmlns:a14="http://schemas.microsoft.com/office/drawing/2010/main" xmlns="" val="0"/>
               </a:ext>
             </a:extLst>
           </a:blip>
@@ -4994,39 +5472,28 @@
           </a:fontRef>
         </p:style>
       </p:cxnSp>
-      <p:sp>
-        <p:nvSpPr>
-          <p:cNvPr id="7" name="TextBox 6"/>
-          <p:cNvSpPr txBox="1"/>
+      <p:graphicFrame>
+        <p:nvGraphicFramePr>
+          <p:cNvPr id="9" name="1 Gráfico"/>
+          <p:cNvGraphicFramePr>
+            <a:graphicFrameLocks noGrp="1"/>
+          </p:cNvGraphicFramePr>
           <p:nvPr/>
-        </p:nvSpPr>
-        <p:spPr>
-          <a:xfrm>
-            <a:off x="467544" y="1772816"/>
-            <a:ext cx="8352928" cy="646331"/>
-          </a:xfrm>
-          <a:prstGeom prst="rect">
-            <a:avLst/>
-          </a:prstGeom>
-          <a:noFill/>
-        </p:spPr>
-        <p:txBody>
-          <a:bodyPr wrap="square" rtlCol="0">
-            <a:spAutoFit/>
-          </a:bodyPr>
-          <a:lstStyle/>
-          <a:p>
-            <a:r>
-              <a:rPr lang="es-AR" sz="3600" dirty="0" smtClean="0"/>
-              <a:t>????</a:t>
-            </a:r>
-          </a:p>
-        </p:txBody>
-      </p:sp>
+        </p:nvGraphicFramePr>
+        <p:xfrm>
+          <a:off x="0" y="1772816"/>
+          <a:ext cx="9144000" cy="4693492"/>
+        </p:xfrm>
+        <a:graphic>
+          <a:graphicData uri="http://schemas.openxmlformats.org/drawingml/2006/chart">
+            <c:chart xmlns:c="http://schemas.openxmlformats.org/drawingml/2006/chart" xmlns:r="http://schemas.openxmlformats.org/officeDocument/2006/relationships" r:id="rId3"/>
+          </a:graphicData>
+        </a:graphic>
+      </p:graphicFrame>
     </p:spTree>
     <p:extLst>
       <p:ext uri="{BB962C8B-B14F-4D97-AF65-F5344CB8AC3E}">
-        <p14:creationId xmlns="" xmlns:p14="http://schemas.microsoft.com/office/powerpoint/2010/main" val="3410899011"/>
+        <p14:creationId xmlns:p14="http://schemas.microsoft.com/office/powerpoint/2010/main" xmlns="" val="3410899011"/>
       </p:ext>
     </p:extLst>
   </p:cSld>
@@ -5152,7 +5619,7 @@
           <a:blip r:embed="rId2" cstate="print">
             <a:extLst>
               <a:ext uri="{28A0092B-C50C-407E-A947-70E740481C1C}">
-                <a14:useLocalDpi xmlns="" xmlns:a14="http://schemas.microsoft.com/office/drawing/2010/main" val="0"/>
+                <a14:useLocalDpi xmlns:a14="http://schemas.microsoft.com/office/drawing/2010/main" xmlns="" val="0"/>
               </a:ext>
             </a:extLst>
           </a:blip>
@@ -5321,9 +5788,10 @@
               <a:buChar char="§"/>
             </a:pPr>
             <a:r>
-              <a:rPr lang="es-AR" sz="3600" dirty="0" smtClean="0"/>
-              <a:t>BlackBerry?</a:t>
-            </a:r>
+              <a:rPr lang="es-AR" sz="3600" dirty="0" err="1" smtClean="0"/>
+              <a:t>BlackBerry</a:t>
+            </a:r>
+            <a:endParaRPr lang="es-AR" sz="3600" dirty="0" smtClean="0"/>
           </a:p>
           <a:p>
             <a:pPr marL="571500" indent="-571500">
@@ -5361,7 +5829,7 @@
     </p:spTree>
     <p:extLst>
       <p:ext uri="{BB962C8B-B14F-4D97-AF65-F5344CB8AC3E}">
-        <p14:creationId xmlns="" xmlns:p14="http://schemas.microsoft.com/office/powerpoint/2010/main" val="2296755584"/>
+        <p14:creationId xmlns:p14="http://schemas.microsoft.com/office/powerpoint/2010/main" xmlns="" val="2296755584"/>
       </p:ext>
     </p:extLst>
   </p:cSld>
@@ -5487,7 +5955,7 @@
           <a:blip r:embed="rId2" cstate="print">
             <a:extLst>
               <a:ext uri="{28A0092B-C50C-407E-A947-70E740481C1C}">
-                <a14:useLocalDpi xmlns="" xmlns:a14="http://schemas.microsoft.com/office/drawing/2010/main" val="0"/>
+                <a14:useLocalDpi xmlns:a14="http://schemas.microsoft.com/office/drawing/2010/main" xmlns="" val="0"/>
               </a:ext>
             </a:extLst>
           </a:blip>
@@ -5597,7 +6065,7 @@
     </p:spTree>
     <p:extLst>
       <p:ext uri="{BB962C8B-B14F-4D97-AF65-F5344CB8AC3E}">
-        <p14:creationId xmlns="" xmlns:p14="http://schemas.microsoft.com/office/powerpoint/2010/main" val="1235372326"/>
+        <p14:creationId xmlns:p14="http://schemas.microsoft.com/office/powerpoint/2010/main" xmlns="" val="1235372326"/>
       </p:ext>
     </p:extLst>
   </p:cSld>
@@ -5723,7 +6191,7 @@
           <a:blip r:embed="rId2" cstate="print">
             <a:extLst>
               <a:ext uri="{28A0092B-C50C-407E-A947-70E740481C1C}">
-                <a14:useLocalDpi xmlns="" xmlns:a14="http://schemas.microsoft.com/office/drawing/2010/main" val="0"/>
+                <a14:useLocalDpi xmlns:a14="http://schemas.microsoft.com/office/drawing/2010/main" xmlns="" val="0"/>
               </a:ext>
             </a:extLst>
           </a:blip>
@@ -5833,7 +6301,7 @@
     </p:spTree>
     <p:extLst>
       <p:ext uri="{BB962C8B-B14F-4D97-AF65-F5344CB8AC3E}">
-        <p14:creationId xmlns="" xmlns:p14="http://schemas.microsoft.com/office/powerpoint/2010/main" val="1235372326"/>
+        <p14:creationId xmlns:p14="http://schemas.microsoft.com/office/powerpoint/2010/main" xmlns="" val="1235372326"/>
       </p:ext>
     </p:extLst>
   </p:cSld>

</xml_diff>